<commit_message>
add matersi sidang v.2
</commit_message>
<xml_diff>
--- a/sidang-1.pptx
+++ b/sidang-1.pptx
@@ -45,33 +45,33 @@
   <p:notesSz cx="6858000" cy="9144000"/>
   <p:embeddedFontLst>
     <p:embeddedFont>
-      <p:font typeface="Malgun Gothic" panose="020B0503020000020004" pitchFamily="34" charset="-127"/>
+      <p:font typeface="나눔바른고딕" panose="020B0604020202020204" charset="-127"/>
       <p:regular r:id="rId37"/>
       <p:bold r:id="rId38"/>
     </p:embeddedFont>
     <p:embeddedFont>
-      <p:font typeface="나눔바른고딕" panose="020B0604020202020204" charset="-127"/>
+      <p:font typeface="Bahnschrift Condensed" panose="020B0502040204020203" pitchFamily="34" charset="0"/>
       <p:regular r:id="rId39"/>
       <p:bold r:id="rId40"/>
     </p:embeddedFont>
     <p:embeddedFont>
-      <p:font typeface="Bahnschrift Condensed" panose="020B0502040204020203" pitchFamily="34" charset="0"/>
+      <p:font typeface="Bodoni MT" panose="02070603080606020203" pitchFamily="18" charset="0"/>
       <p:regular r:id="rId41"/>
       <p:bold r:id="rId42"/>
-    </p:embeddedFont>
-    <p:embeddedFont>
-      <p:font typeface="Bodoni MT" panose="02070603080606020203" pitchFamily="18" charset="0"/>
-      <p:regular r:id="rId43"/>
-      <p:bold r:id="rId44"/>
-      <p:italic r:id="rId45"/>
-      <p:boldItalic r:id="rId46"/>
+      <p:italic r:id="rId43"/>
+      <p:boldItalic r:id="rId44"/>
     </p:embeddedFont>
     <p:embeddedFont>
       <p:font typeface="Calibri" panose="020F0502020204030204" pitchFamily="34" charset="0"/>
-      <p:regular r:id="rId47"/>
-      <p:bold r:id="rId48"/>
-      <p:italic r:id="rId49"/>
-      <p:boldItalic r:id="rId50"/>
+      <p:regular r:id="rId45"/>
+      <p:bold r:id="rId46"/>
+      <p:italic r:id="rId47"/>
+      <p:boldItalic r:id="rId48"/>
+    </p:embeddedFont>
+    <p:embeddedFont>
+      <p:font typeface="Malgun Gothic" panose="020B0503020000020004" pitchFamily="34" charset="-127"/>
+      <p:regular r:id="rId49"/>
+      <p:bold r:id="rId50"/>
     </p:embeddedFont>
   </p:embeddedFontLst>
   <p:defaultTextStyle>
@@ -306,7 +306,7 @@
           <a:p>
             <a:fld id="{B20C0507-5985-4FA5-9FE9-15DA040FED7E}" type="datetimeFigureOut">
               <a:rPr lang="ko-KR" altLang="en-US" smtClean="0"/>
-              <a:t>2021-11-03</a:t>
+              <a:t>2021-11-04</a:t>
             </a:fld>
             <a:endParaRPr lang="ko-KR" altLang="en-US"/>
           </a:p>
@@ -474,7 +474,7 @@
           <a:p>
             <a:fld id="{B20C0507-5985-4FA5-9FE9-15DA040FED7E}" type="datetimeFigureOut">
               <a:rPr lang="ko-KR" altLang="en-US" smtClean="0"/>
-              <a:t>2021-11-03</a:t>
+              <a:t>2021-11-04</a:t>
             </a:fld>
             <a:endParaRPr lang="ko-KR" altLang="en-US"/>
           </a:p>
@@ -652,7 +652,7 @@
           <a:p>
             <a:fld id="{B20C0507-5985-4FA5-9FE9-15DA040FED7E}" type="datetimeFigureOut">
               <a:rPr lang="ko-KR" altLang="en-US" smtClean="0"/>
-              <a:t>2021-11-03</a:t>
+              <a:t>2021-11-04</a:t>
             </a:fld>
             <a:endParaRPr lang="ko-KR" altLang="en-US"/>
           </a:p>
@@ -820,7 +820,7 @@
           <a:p>
             <a:fld id="{B20C0507-5985-4FA5-9FE9-15DA040FED7E}" type="datetimeFigureOut">
               <a:rPr lang="ko-KR" altLang="en-US" smtClean="0"/>
-              <a:t>2021-11-03</a:t>
+              <a:t>2021-11-04</a:t>
             </a:fld>
             <a:endParaRPr lang="ko-KR" altLang="en-US"/>
           </a:p>
@@ -1065,7 +1065,7 @@
           <a:p>
             <a:fld id="{B20C0507-5985-4FA5-9FE9-15DA040FED7E}" type="datetimeFigureOut">
               <a:rPr lang="ko-KR" altLang="en-US" smtClean="0"/>
-              <a:t>2021-11-03</a:t>
+              <a:t>2021-11-04</a:t>
             </a:fld>
             <a:endParaRPr lang="ko-KR" altLang="en-US"/>
           </a:p>
@@ -1294,7 +1294,7 @@
           <a:p>
             <a:fld id="{B20C0507-5985-4FA5-9FE9-15DA040FED7E}" type="datetimeFigureOut">
               <a:rPr lang="ko-KR" altLang="en-US" smtClean="0"/>
-              <a:t>2021-11-03</a:t>
+              <a:t>2021-11-04</a:t>
             </a:fld>
             <a:endParaRPr lang="ko-KR" altLang="en-US"/>
           </a:p>
@@ -1658,7 +1658,7 @@
           <a:p>
             <a:fld id="{B20C0507-5985-4FA5-9FE9-15DA040FED7E}" type="datetimeFigureOut">
               <a:rPr lang="ko-KR" altLang="en-US" smtClean="0"/>
-              <a:t>2021-11-03</a:t>
+              <a:t>2021-11-04</a:t>
             </a:fld>
             <a:endParaRPr lang="ko-KR" altLang="en-US"/>
           </a:p>
@@ -1775,7 +1775,7 @@
           <a:p>
             <a:fld id="{B20C0507-5985-4FA5-9FE9-15DA040FED7E}" type="datetimeFigureOut">
               <a:rPr lang="ko-KR" altLang="en-US" smtClean="0"/>
-              <a:t>2021-11-03</a:t>
+              <a:t>2021-11-04</a:t>
             </a:fld>
             <a:endParaRPr lang="ko-KR" altLang="en-US"/>
           </a:p>
@@ -1870,7 +1870,7 @@
           <a:p>
             <a:fld id="{B20C0507-5985-4FA5-9FE9-15DA040FED7E}" type="datetimeFigureOut">
               <a:rPr lang="ko-KR" altLang="en-US" smtClean="0"/>
-              <a:t>2021-11-03</a:t>
+              <a:t>2021-11-04</a:t>
             </a:fld>
             <a:endParaRPr lang="ko-KR" altLang="en-US"/>
           </a:p>
@@ -2145,7 +2145,7 @@
           <a:p>
             <a:fld id="{B20C0507-5985-4FA5-9FE9-15DA040FED7E}" type="datetimeFigureOut">
               <a:rPr lang="ko-KR" altLang="en-US" smtClean="0"/>
-              <a:t>2021-11-03</a:t>
+              <a:t>2021-11-04</a:t>
             </a:fld>
             <a:endParaRPr lang="ko-KR" altLang="en-US"/>
           </a:p>
@@ -2397,7 +2397,7 @@
           <a:p>
             <a:fld id="{B20C0507-5985-4FA5-9FE9-15DA040FED7E}" type="datetimeFigureOut">
               <a:rPr lang="ko-KR" altLang="en-US" smtClean="0"/>
-              <a:t>2021-11-03</a:t>
+              <a:t>2021-11-04</a:t>
             </a:fld>
             <a:endParaRPr lang="ko-KR" altLang="en-US"/>
           </a:p>
@@ -2608,7 +2608,7 @@
           <a:p>
             <a:fld id="{B20C0507-5985-4FA5-9FE9-15DA040FED7E}" type="datetimeFigureOut">
               <a:rPr lang="ko-KR" altLang="en-US" smtClean="0"/>
-              <a:t>2021-11-03</a:t>
+              <a:t>2021-11-04</a:t>
             </a:fld>
             <a:endParaRPr lang="ko-KR" altLang="en-US"/>
           </a:p>
@@ -18433,7 +18433,7 @@
             </a:r>
             <a:r>
               <a:rPr lang="en-US" sz="2400" dirty="0" err="1"/>
-              <a:t>wajag</a:t>
+              <a:t>wajah</a:t>
             </a:r>
             <a:r>
               <a:rPr lang="en-US" sz="2400" dirty="0"/>
@@ -21043,7 +21043,7 @@
             </a:r>
             <a:r>
               <a:rPr lang="en-US" sz="2400" dirty="0" err="1"/>
-              <a:t>wajag</a:t>
+              <a:t>wajah</a:t>
             </a:r>
             <a:r>
               <a:rPr lang="en-US" sz="2400" dirty="0"/>
@@ -21741,7 +21741,7 @@
             </a:r>
             <a:r>
               <a:rPr lang="en-US" sz="2400" dirty="0" err="1"/>
-              <a:t>sudah</a:t>
+              <a:t>sebelumnya</a:t>
             </a:r>
             <a:r>
               <a:rPr lang="en-US" sz="2400" dirty="0"/>
@@ -21749,7 +21749,7 @@
             </a:r>
             <a:r>
               <a:rPr lang="en-US" sz="2400" dirty="0" err="1"/>
-              <a:t>sebelumnya</a:t>
+              <a:t>sudah</a:t>
             </a:r>
             <a:r>
               <a:rPr lang="en-US" sz="2400" dirty="0"/>

</xml_diff>